<commit_message>
Update Phase-3_project, README, reports/Telco_Customer_Churn_Presentation, reports/Telco_Customer_Churn_Presentation
</commit_message>
<xml_diff>
--- a/reports/Telco_Customer_Churn_Presentation.pptx
+++ b/reports/Telco_Customer_Churn_Presentation.pptx
@@ -16,6 +16,7 @@
     <p:sldId id="264" r:id="rId10"/>
     <p:sldId id="265" r:id="rId11"/>
     <p:sldId id="266" r:id="rId12"/>
+    <p:sldId id="267" r:id="rId13"/>
   </p:sldIdLst>
   <p:sldSz cx="9144000" cy="6858000" type="screen4x3"/>
   <p:notesSz cx="6858000" cy="9144000"/>
@@ -649,7 +650,7 @@
           <a:p>
             <a:fld id="{5BCAD085-E8A6-8845-BD4E-CB4CCA059FC4}" type="datetimeFigureOut">
               <a:rPr lang="en-US" smtClean="0"/>
-              <a:t>12/18/2025</a:t>
+              <a:t>12/19/2025</a:t>
             </a:fld>
             <a:endParaRPr lang="en-US"/>
           </a:p>
@@ -750,7 +751,7 @@
           </a:ln>
           <a:extLst>
             <a:ext uri="{91240B29-F687-4f45-9708-019B960494DF}">
-              <a14:hiddenLine xmlns:a14="http://schemas.microsoft.com/office/drawing/2010/main" xmlns="" w="9525">
+              <a14:hiddenLine xmlns="" xmlns:a14="http://schemas.microsoft.com/office/drawing/2010/main" w="9525">
                 <a:solidFill>
                   <a:srgbClr val="000000"/>
                 </a:solidFill>
@@ -805,7 +806,7 @@
           </a:ln>
           <a:extLst>
             <a:ext uri="{91240B29-F687-4f45-9708-019B960494DF}">
-              <a14:hiddenLine xmlns:a14="http://schemas.microsoft.com/office/drawing/2010/main" xmlns="" w="9525">
+              <a14:hiddenLine xmlns="" xmlns:a14="http://schemas.microsoft.com/office/drawing/2010/main" w="9525">
                 <a:solidFill>
                   <a:srgbClr val="000000"/>
                 </a:solidFill>
@@ -1060,7 +1061,7 @@
           <a:p>
             <a:fld id="{5BCAD085-E8A6-8845-BD4E-CB4CCA059FC4}" type="datetimeFigureOut">
               <a:rPr lang="en-US" smtClean="0"/>
-              <a:t>12/18/2025</a:t>
+              <a:t>12/19/2025</a:t>
             </a:fld>
             <a:endParaRPr lang="en-US"/>
           </a:p>
@@ -1308,7 +1309,7 @@
           <a:p>
             <a:fld id="{5BCAD085-E8A6-8845-BD4E-CB4CCA059FC4}" type="datetimeFigureOut">
               <a:rPr lang="en-US" smtClean="0"/>
-              <a:t>12/18/2025</a:t>
+              <a:t>12/19/2025</a:t>
             </a:fld>
             <a:endParaRPr lang="en-US"/>
           </a:p>
@@ -1848,7 +1849,7 @@
           <a:p>
             <a:fld id="{5BCAD085-E8A6-8845-BD4E-CB4CCA059FC4}" type="datetimeFigureOut">
               <a:rPr lang="en-US" smtClean="0"/>
-              <a:t>12/18/2025</a:t>
+              <a:t>12/19/2025</a:t>
             </a:fld>
             <a:endParaRPr lang="en-US"/>
           </a:p>
@@ -2096,7 +2097,7 @@
           <a:p>
             <a:fld id="{5BCAD085-E8A6-8845-BD4E-CB4CCA059FC4}" type="datetimeFigureOut">
               <a:rPr lang="en-US" smtClean="0"/>
-              <a:t>12/18/2025</a:t>
+              <a:t>12/19/2025</a:t>
             </a:fld>
             <a:endParaRPr lang="en-US"/>
           </a:p>
@@ -2628,7 +2629,7 @@
           <a:p>
             <a:fld id="{5BCAD085-E8A6-8845-BD4E-CB4CCA059FC4}" type="datetimeFigureOut">
               <a:rPr lang="en-US" smtClean="0"/>
-              <a:t>12/18/2025</a:t>
+              <a:t>12/19/2025</a:t>
             </a:fld>
             <a:endParaRPr lang="en-US"/>
           </a:p>
@@ -2925,7 +2926,7 @@
           <a:p>
             <a:fld id="{5BCAD085-E8A6-8845-BD4E-CB4CCA059FC4}" type="datetimeFigureOut">
               <a:rPr lang="en-US" smtClean="0"/>
-              <a:t>12/18/2025</a:t>
+              <a:t>12/19/2025</a:t>
             </a:fld>
             <a:endParaRPr lang="en-US"/>
           </a:p>
@@ -3099,7 +3100,7 @@
           <a:p>
             <a:fld id="{5BCAD085-E8A6-8845-BD4E-CB4CCA059FC4}" type="datetimeFigureOut">
               <a:rPr lang="en-US" smtClean="0"/>
-              <a:t>12/18/2025</a:t>
+              <a:t>12/19/2025</a:t>
             </a:fld>
             <a:endParaRPr lang="en-US"/>
           </a:p>
@@ -3279,7 +3280,7 @@
           <a:p>
             <a:fld id="{5BCAD085-E8A6-8845-BD4E-CB4CCA059FC4}" type="datetimeFigureOut">
               <a:rPr lang="en-US" smtClean="0"/>
-              <a:t>12/18/2025</a:t>
+              <a:t>12/19/2025</a:t>
             </a:fld>
             <a:endParaRPr lang="en-US"/>
           </a:p>
@@ -3464,7 +3465,7 @@
           <a:p>
             <a:fld id="{5BCAD085-E8A6-8845-BD4E-CB4CCA059FC4}" type="datetimeFigureOut">
               <a:rPr lang="en-US" smtClean="0"/>
-              <a:t>12/18/2025</a:t>
+              <a:t>12/19/2025</a:t>
             </a:fld>
             <a:endParaRPr lang="en-US"/>
           </a:p>
@@ -3720,7 +3721,7 @@
           <a:p>
             <a:fld id="{5BCAD085-E8A6-8845-BD4E-CB4CCA059FC4}" type="datetimeFigureOut">
               <a:rPr lang="en-US" smtClean="0"/>
-              <a:t>12/18/2025</a:t>
+              <a:t>12/19/2025</a:t>
             </a:fld>
             <a:endParaRPr lang="en-US"/>
           </a:p>
@@ -4022,7 +4023,7 @@
           <a:p>
             <a:fld id="{5BCAD085-E8A6-8845-BD4E-CB4CCA059FC4}" type="datetimeFigureOut">
               <a:rPr lang="en-US" smtClean="0"/>
-              <a:t>12/18/2025</a:t>
+              <a:t>12/19/2025</a:t>
             </a:fld>
             <a:endParaRPr lang="en-US"/>
           </a:p>
@@ -4464,7 +4465,7 @@
           <a:p>
             <a:fld id="{5BCAD085-E8A6-8845-BD4E-CB4CCA059FC4}" type="datetimeFigureOut">
               <a:rPr lang="en-US" smtClean="0"/>
-              <a:t>12/18/2025</a:t>
+              <a:t>12/19/2025</a:t>
             </a:fld>
             <a:endParaRPr lang="en-US"/>
           </a:p>
@@ -4582,7 +4583,7 @@
           <a:p>
             <a:fld id="{5BCAD085-E8A6-8845-BD4E-CB4CCA059FC4}" type="datetimeFigureOut">
               <a:rPr lang="en-US" smtClean="0"/>
-              <a:t>12/18/2025</a:t>
+              <a:t>12/19/2025</a:t>
             </a:fld>
             <a:endParaRPr lang="en-US"/>
           </a:p>
@@ -4677,7 +4678,7 @@
           <a:p>
             <a:fld id="{5BCAD085-E8A6-8845-BD4E-CB4CCA059FC4}" type="datetimeFigureOut">
               <a:rPr lang="en-US" smtClean="0"/>
-              <a:t>12/18/2025</a:t>
+              <a:t>12/19/2025</a:t>
             </a:fld>
             <a:endParaRPr lang="en-US"/>
           </a:p>
@@ -4960,7 +4961,7 @@
           <a:p>
             <a:fld id="{5BCAD085-E8A6-8845-BD4E-CB4CCA059FC4}" type="datetimeFigureOut">
               <a:rPr lang="en-US" smtClean="0"/>
-              <a:t>12/18/2025</a:t>
+              <a:t>12/19/2025</a:t>
             </a:fld>
             <a:endParaRPr lang="en-US"/>
           </a:p>
@@ -5251,7 +5252,7 @@
           <a:p>
             <a:fld id="{5BCAD085-E8A6-8845-BD4E-CB4CCA059FC4}" type="datetimeFigureOut">
               <a:rPr lang="en-US" smtClean="0"/>
-              <a:t>12/18/2025</a:t>
+              <a:t>12/19/2025</a:t>
             </a:fld>
             <a:endParaRPr lang="en-US"/>
           </a:p>
@@ -5775,7 +5776,7 @@
           <a:p>
             <a:fld id="{5BCAD085-E8A6-8845-BD4E-CB4CCA059FC4}" type="datetimeFigureOut">
               <a:rPr lang="en-US" smtClean="0"/>
-              <a:t>12/18/2025</a:t>
+              <a:t>12/19/2025</a:t>
             </a:fld>
             <a:endParaRPr lang="en-US"/>
           </a:p>
@@ -6580,10 +6581,82 @@
               <a:rPr dirty="0"/>
               <a:t>Recall-focused modeling aligns with business priorities.</a:t>
             </a:r>
+            <a:endParaRPr lang="en-US" dirty="0"/>
+          </a:p>
+          <a:p>
+            <a:pPr algn="just"/>
+            <a:r>
+              <a:rPr lang="en-US" dirty="0"/>
+              <a:t>These insights support retention and marketing teams in proactive decision-making</a:t>
+            </a:r>
+            <a:endParaRPr dirty="0"/>
           </a:p>
         </p:txBody>
       </p:sp>
     </p:spTree>
+  </p:cSld>
+  <p:clrMapOvr>
+    <a:masterClrMapping/>
+  </p:clrMapOvr>
+</p:sld>
+</file>
+
+<file path=ppt/slides/slide12.xml><?xml version="1.0" encoding="utf-8"?>
+<p:sld xmlns:a="http://schemas.openxmlformats.org/drawingml/2006/main" xmlns:r="http://schemas.openxmlformats.org/officeDocument/2006/relationships" xmlns:p="http://schemas.openxmlformats.org/presentationml/2006/main">
+  <p:cSld>
+    <p:spTree>
+      <p:nvGrpSpPr>
+        <p:cNvPr id="1" name=""/>
+        <p:cNvGrpSpPr/>
+        <p:nvPr/>
+      </p:nvGrpSpPr>
+      <p:grpSpPr>
+        <a:xfrm>
+          <a:off x="0" y="0"/>
+          <a:ext cx="0" cy="0"/>
+          <a:chOff x="0" y="0"/>
+          <a:chExt cx="0" cy="0"/>
+        </a:xfrm>
+      </p:grpSpPr>
+      <p:sp>
+        <p:nvSpPr>
+          <p:cNvPr id="3" name="Content Placeholder 2">
+            <a:extLst>
+              <a:ext uri="{FF2B5EF4-FFF2-40B4-BE49-F238E27FC236}">
+                <a16:creationId xmlns:a16="http://schemas.microsoft.com/office/drawing/2014/main" id="{D9AC4D53-3C18-5285-A1D7-98B1F56B15D6}"/>
+              </a:ext>
+            </a:extLst>
+          </p:cNvPr>
+          <p:cNvSpPr>
+            <a:spLocks noGrp="1"/>
+          </p:cNvSpPr>
+          <p:nvPr>
+            <p:ph idx="1"/>
+          </p:nvPr>
+        </p:nvSpPr>
+        <p:spPr/>
+        <p:txBody>
+          <a:bodyPr>
+            <a:normAutofit/>
+          </a:bodyPr>
+          <a:lstStyle/>
+          <a:p>
+            <a:pPr marL="0" indent="0" algn="ctr">
+              <a:buNone/>
+            </a:pPr>
+            <a:r>
+              <a:rPr lang="en-US" sz="8800" dirty="0"/>
+              <a:t>THANK YOU</a:t>
+            </a:r>
+          </a:p>
+        </p:txBody>
+      </p:sp>
+    </p:spTree>
+    <p:extLst>
+      <p:ext uri="{BB962C8B-B14F-4D97-AF65-F5344CB8AC3E}">
+        <p14:creationId xmlns:p14="http://schemas.microsoft.com/office/powerpoint/2010/main" val="4293827112"/>
+      </p:ext>
+    </p:extLst>
   </p:cSld>
   <p:clrMapOvr>
     <a:masterClrMapping/>
@@ -6678,15 +6751,7 @@
             <a:pPr algn="just"/>
             <a:r>
               <a:rPr lang="en-US" dirty="0"/>
-              <a:t>The g</a:t>
-            </a:r>
-            <a:r>
-              <a:rPr dirty="0"/>
-              <a:t>oal</a:t>
-            </a:r>
-            <a:r>
-              <a:rPr lang="en-US" dirty="0"/>
-              <a:t> is to</a:t>
+              <a:t>The goal is to</a:t>
             </a:r>
             <a:r>
               <a:rPr dirty="0"/>
@@ -6694,7 +6759,7 @@
             </a:r>
             <a:r>
               <a:rPr lang="en-US" dirty="0"/>
-              <a:t>device</a:t>
+              <a:t>devise</a:t>
             </a:r>
             <a:r>
               <a:rPr dirty="0"/>
@@ -6774,6 +6839,7 @@
               <a:rPr dirty="0"/>
               <a:t>Telco Customer Churn dataset with 7,043 customer records.</a:t>
             </a:r>
+            <a:endParaRPr lang="en-US" dirty="0"/>
           </a:p>
           <a:p>
             <a:pPr algn="just"/>
@@ -6792,6 +6858,18 @@
               <a:rPr dirty="0"/>
               <a:t>Target variable indicates whether a customer churned.</a:t>
             </a:r>
+            <a:endParaRPr lang="en-US" dirty="0"/>
+          </a:p>
+          <a:p>
+            <a:pPr algn="just"/>
+            <a:r>
+              <a:rPr lang="en-US" dirty="0"/>
+              <a:t>This dataset provides a realistic representation of customer behavior in the telecom industry</a:t>
+            </a:r>
+          </a:p>
+          <a:p>
+            <a:pPr algn="just"/>
+            <a:endParaRPr dirty="0"/>
           </a:p>
         </p:txBody>
       </p:sp>
@@ -6884,6 +6962,7 @@
               <a:rPr dirty="0"/>
               <a:t>Customers with low tenure are more likely to churn.</a:t>
             </a:r>
+            <a:endParaRPr lang="en-US" dirty="0"/>
           </a:p>
         </p:txBody>
       </p:sp>
@@ -6976,6 +7055,15 @@
               <a:rPr dirty="0"/>
               <a:t> to ensure consistent preprocessing.</a:t>
             </a:r>
+            <a:endParaRPr lang="en-US" dirty="0"/>
+          </a:p>
+          <a:p>
+            <a:pPr algn="just"/>
+            <a:r>
+              <a:rPr lang="en-US" dirty="0"/>
+              <a:t>Preprocessing ensured consistent feature treatment and prevented data leakage.</a:t>
+            </a:r>
+            <a:endParaRPr dirty="0"/>
           </a:p>
         </p:txBody>
       </p:sp>
@@ -7159,6 +7247,15 @@
               <a:rPr dirty="0"/>
               <a:t> optimizing Recall.</a:t>
             </a:r>
+            <a:endParaRPr lang="en-US" dirty="0"/>
+          </a:p>
+          <a:p>
+            <a:pPr algn="just"/>
+            <a:r>
+              <a:rPr lang="en-US" dirty="0"/>
+              <a:t>Recall was prioritized during tuning to minimize missed churners</a:t>
+            </a:r>
+            <a:endParaRPr dirty="0"/>
           </a:p>
         </p:txBody>
       </p:sp>
@@ -7221,27 +7318,15 @@
         </p:nvSpPr>
         <p:spPr/>
         <p:txBody>
-          <a:bodyPr/>
+          <a:bodyPr>
+            <a:normAutofit/>
+          </a:bodyPr>
           <a:lstStyle/>
           <a:p>
             <a:pPr algn="just"/>
             <a:r>
-              <a:rPr dirty="0"/>
-              <a:t>Baseline models achieved limited Recall.</a:t>
-            </a:r>
-          </a:p>
-          <a:p>
-            <a:pPr algn="just"/>
-            <a:r>
-              <a:rPr dirty="0"/>
-              <a:t>Logistic Regression + SMOTE achieved highest Recall (~79%).</a:t>
-            </a:r>
-          </a:p>
-          <a:p>
-            <a:pPr algn="just"/>
-            <a:r>
-              <a:rPr dirty="0"/>
-              <a:t>Decision Tree + SMOTE achieved comparable performance.</a:t>
+              <a:rPr lang="en-US" dirty="0"/>
+              <a:t>Models were evaluated primarily using Recall, as missing churners carries high business cost. The tuned Logistic Regression with SMOTE achieved the strongest Recall (~79%), significantly reducing missed churn cases.</a:t>
             </a:r>
           </a:p>
         </p:txBody>

</xml_diff>